<commit_message>
across host pi update.
</commit_message>
<xml_diff>
--- a/Summary/20211201_microbiome_demographic_slides.pptx
+++ b/Summary/20211201_microbiome_demographic_slides.pptx
@@ -5,7 +5,7 @@
     <p:sldMasterId id="2147483648" r:id="rId1"/>
   </p:sldMasterIdLst>
   <p:notesMasterIdLst>
-    <p:notesMasterId r:id="rId7"/>
+    <p:notesMasterId r:id="rId8"/>
   </p:notesMasterIdLst>
   <p:sldIdLst>
     <p:sldId id="256" r:id="rId2"/>
@@ -13,6 +13,7 @@
     <p:sldId id="343" r:id="rId4"/>
     <p:sldId id="339" r:id="rId5"/>
     <p:sldId id="278" r:id="rId6"/>
+    <p:sldId id="344" r:id="rId7"/>
   </p:sldIdLst>
   <p:sldSz cx="12192000" cy="6858000"/>
   <p:notesSz cx="6858000" cy="9144000"/>
@@ -121,6 +122,7 @@
             <p14:sldId id="343"/>
             <p14:sldId id="339"/>
             <p14:sldId id="278"/>
+            <p14:sldId id="344"/>
           </p14:sldIdLst>
         </p14:section>
       </p14:sectionLst>
@@ -135,6 +137,7 @@
 <file path=ppt/revisionInfo.xml><?xml version="1.0" encoding="utf-8"?>
 <p1510:revInfo xmlns:a="http://schemas.openxmlformats.org/drawingml/2006/main" xmlns:r="http://schemas.openxmlformats.org/officeDocument/2006/relationships" xmlns:p1510="http://schemas.microsoft.com/office/powerpoint/2015/10/main">
   <p1510:revLst>
+    <p1510:client id="{6C9B5381-67D8-4494-91BB-E376A9349751}" v="1" dt="2021-12-02T21:06:36.479"/>
     <p1510:client id="{7BAD0EFE-E722-47EE-9CE5-17103013536F}" v="8" dt="2021-12-02T03:37:01.554"/>
   </p1510:revLst>
 </p1510:revInfo>
@@ -142,6 +145,37 @@
 
 <file path=ppt/changesInfos/changesInfo1.xml><?xml version="1.0" encoding="utf-8"?>
 <pc:chgInfo xmlns:a="http://schemas.openxmlformats.org/drawingml/2006/main" xmlns:r="http://schemas.openxmlformats.org/officeDocument/2006/relationships" xmlns:ac="http://schemas.microsoft.com/office/drawing/2013/main/command" xmlns:pc="http://schemas.microsoft.com/office/powerpoint/2013/main/command">
+  <pc:docChgLst>
+    <pc:chgData name="Jonathan Mah" userId="5261b2f2f3e51194" providerId="LiveId" clId="{6C9B5381-67D8-4494-91BB-E376A9349751}"/>
+    <pc:docChg chg="custSel addSld modSld">
+      <pc:chgData name="Jonathan Mah" userId="5261b2f2f3e51194" providerId="LiveId" clId="{6C9B5381-67D8-4494-91BB-E376A9349751}" dt="2021-12-02T21:57:21.946" v="547" actId="20577"/>
+      <pc:docMkLst>
+        <pc:docMk/>
+      </pc:docMkLst>
+      <pc:sldChg chg="modNotesTx">
+        <pc:chgData name="Jonathan Mah" userId="5261b2f2f3e51194" providerId="LiveId" clId="{6C9B5381-67D8-4494-91BB-E376A9349751}" dt="2021-12-02T21:06:32.220" v="40" actId="20577"/>
+        <pc:sldMkLst>
+          <pc:docMk/>
+          <pc:sldMk cId="1384255232" sldId="343"/>
+        </pc:sldMkLst>
+      </pc:sldChg>
+      <pc:sldChg chg="modSp add mod">
+        <pc:chgData name="Jonathan Mah" userId="5261b2f2f3e51194" providerId="LiveId" clId="{6C9B5381-67D8-4494-91BB-E376A9349751}" dt="2021-12-02T21:57:21.946" v="547" actId="20577"/>
+        <pc:sldMkLst>
+          <pc:docMk/>
+          <pc:sldMk cId="897933235" sldId="344"/>
+        </pc:sldMkLst>
+        <pc:spChg chg="mod">
+          <ac:chgData name="Jonathan Mah" userId="5261b2f2f3e51194" providerId="LiveId" clId="{6C9B5381-67D8-4494-91BB-E376A9349751}" dt="2021-12-02T21:57:21.946" v="547" actId="20577"/>
+          <ac:spMkLst>
+            <pc:docMk/>
+            <pc:sldMk cId="897933235" sldId="344"/>
+            <ac:spMk id="3" creationId="{B7017510-3A51-4778-BB7F-0F91AE0D6F96}"/>
+          </ac:spMkLst>
+        </pc:spChg>
+      </pc:sldChg>
+    </pc:docChg>
+  </pc:docChgLst>
   <pc:docChgLst>
     <pc:chgData name="Jonathan Mah" userId="5261b2f2f3e51194" providerId="LiveId" clId="{7BAD0EFE-E722-47EE-9CE5-17103013536F}"/>
     <pc:docChg chg="custSel addSld delSld modSld sldOrd modSection">
@@ -404,7 +438,7 @@
           <a:p>
             <a:fld id="{2F446724-7A58-4020-9182-8374F0305DD3}" type="datetimeFigureOut">
               <a:rPr lang="en-US" smtClean="0"/>
-              <a:t>12/1/2021</a:t>
+              <a:t>12/2/2021</a:t>
             </a:fld>
             <a:endParaRPr lang="en-US"/>
           </a:p>
@@ -715,6 +749,93 @@
           <a:bodyPr/>
           <a:lstStyle/>
           <a:p>
+            <a:r>
+              <a:rPr lang="en-US" dirty="0"/>
+              <a:t>Paired t-test within-and-across-host pi</a:t>
+            </a:r>
+          </a:p>
+        </p:txBody>
+      </p:sp>
+      <p:sp>
+        <p:nvSpPr>
+          <p:cNvPr id="4" name="Slide Number Placeholder 3"/>
+          <p:cNvSpPr>
+            <a:spLocks noGrp="1"/>
+          </p:cNvSpPr>
+          <p:nvPr>
+            <p:ph type="sldNum" sz="quarter" idx="5"/>
+          </p:nvPr>
+        </p:nvSpPr>
+        <p:spPr/>
+        <p:txBody>
+          <a:bodyPr/>
+          <a:lstStyle/>
+          <a:p>
+            <a:fld id="{9D984E8B-8157-4976-ABDF-6DA2CAC3440F}" type="slidenum">
+              <a:rPr lang="en-US" smtClean="0"/>
+              <a:t>3</a:t>
+            </a:fld>
+            <a:endParaRPr lang="en-US"/>
+          </a:p>
+        </p:txBody>
+      </p:sp>
+    </p:spTree>
+    <p:extLst>
+      <p:ext uri="{BB962C8B-B14F-4D97-AF65-F5344CB8AC3E}">
+        <p14:creationId xmlns:p14="http://schemas.microsoft.com/office/powerpoint/2010/main" val="3871759569"/>
+      </p:ext>
+    </p:extLst>
+  </p:cSld>
+  <p:clrMapOvr>
+    <a:masterClrMapping/>
+  </p:clrMapOvr>
+</p:notes>
+</file>
+
+<file path=ppt/notesSlides/notesSlide2.xml><?xml version="1.0" encoding="utf-8"?>
+<p:notes xmlns:a="http://schemas.openxmlformats.org/drawingml/2006/main" xmlns:r="http://schemas.openxmlformats.org/officeDocument/2006/relationships" xmlns:p="http://schemas.openxmlformats.org/presentationml/2006/main">
+  <p:cSld>
+    <p:spTree>
+      <p:nvGrpSpPr>
+        <p:cNvPr id="1" name=""/>
+        <p:cNvGrpSpPr/>
+        <p:nvPr/>
+      </p:nvGrpSpPr>
+      <p:grpSpPr>
+        <a:xfrm>
+          <a:off x="0" y="0"/>
+          <a:ext cx="0" cy="0"/>
+          <a:chOff x="0" y="0"/>
+          <a:chExt cx="0" cy="0"/>
+        </a:xfrm>
+      </p:grpSpPr>
+      <p:sp>
+        <p:nvSpPr>
+          <p:cNvPr id="2" name="Slide Image Placeholder 1"/>
+          <p:cNvSpPr>
+            <a:spLocks noGrp="1" noRot="1" noChangeAspect="1"/>
+          </p:cNvSpPr>
+          <p:nvPr>
+            <p:ph type="sldImg"/>
+          </p:nvPr>
+        </p:nvSpPr>
+        <p:spPr/>
+      </p:sp>
+      <p:sp>
+        <p:nvSpPr>
+          <p:cNvPr id="3" name="Notes Placeholder 2"/>
+          <p:cNvSpPr>
+            <a:spLocks noGrp="1"/>
+          </p:cNvSpPr>
+          <p:nvPr>
+            <p:ph type="body" idx="1"/>
+          </p:nvPr>
+        </p:nvSpPr>
+        <p:spPr/>
+        <p:txBody>
+          <a:bodyPr/>
+          <a:lstStyle/>
+          <a:p>
             <a:endParaRPr lang="en-US" dirty="0"/>
           </a:p>
         </p:txBody>
@@ -746,6 +867,90 @@
     <p:extLst>
       <p:ext uri="{BB962C8B-B14F-4D97-AF65-F5344CB8AC3E}">
         <p14:creationId xmlns:p14="http://schemas.microsoft.com/office/powerpoint/2010/main" val="1799097093"/>
+      </p:ext>
+    </p:extLst>
+  </p:cSld>
+  <p:clrMapOvr>
+    <a:masterClrMapping/>
+  </p:clrMapOvr>
+</p:notes>
+</file>
+
+<file path=ppt/notesSlides/notesSlide3.xml><?xml version="1.0" encoding="utf-8"?>
+<p:notes xmlns:a="http://schemas.openxmlformats.org/drawingml/2006/main" xmlns:r="http://schemas.openxmlformats.org/officeDocument/2006/relationships" xmlns:p="http://schemas.openxmlformats.org/presentationml/2006/main">
+  <p:cSld>
+    <p:spTree>
+      <p:nvGrpSpPr>
+        <p:cNvPr id="1" name=""/>
+        <p:cNvGrpSpPr/>
+        <p:nvPr/>
+      </p:nvGrpSpPr>
+      <p:grpSpPr>
+        <a:xfrm>
+          <a:off x="0" y="0"/>
+          <a:ext cx="0" cy="0"/>
+          <a:chOff x="0" y="0"/>
+          <a:chExt cx="0" cy="0"/>
+        </a:xfrm>
+      </p:grpSpPr>
+      <p:sp>
+        <p:nvSpPr>
+          <p:cNvPr id="2" name="Slide Image Placeholder 1"/>
+          <p:cNvSpPr>
+            <a:spLocks noGrp="1" noRot="1" noChangeAspect="1"/>
+          </p:cNvSpPr>
+          <p:nvPr>
+            <p:ph type="sldImg"/>
+          </p:nvPr>
+        </p:nvSpPr>
+        <p:spPr/>
+      </p:sp>
+      <p:sp>
+        <p:nvSpPr>
+          <p:cNvPr id="3" name="Notes Placeholder 2"/>
+          <p:cNvSpPr>
+            <a:spLocks noGrp="1"/>
+          </p:cNvSpPr>
+          <p:nvPr>
+            <p:ph type="body" idx="1"/>
+          </p:nvPr>
+        </p:nvSpPr>
+        <p:spPr/>
+        <p:txBody>
+          <a:bodyPr/>
+          <a:lstStyle/>
+          <a:p>
+            <a:endParaRPr lang="en-US" dirty="0"/>
+          </a:p>
+        </p:txBody>
+      </p:sp>
+      <p:sp>
+        <p:nvSpPr>
+          <p:cNvPr id="4" name="Slide Number Placeholder 3"/>
+          <p:cNvSpPr>
+            <a:spLocks noGrp="1"/>
+          </p:cNvSpPr>
+          <p:nvPr>
+            <p:ph type="sldNum" sz="quarter" idx="5"/>
+          </p:nvPr>
+        </p:nvSpPr>
+        <p:spPr/>
+        <p:txBody>
+          <a:bodyPr/>
+          <a:lstStyle/>
+          <a:p>
+            <a:fld id="{9D984E8B-8157-4976-ABDF-6DA2CAC3440F}" type="slidenum">
+              <a:rPr lang="en-US" smtClean="0"/>
+              <a:t>6</a:t>
+            </a:fld>
+            <a:endParaRPr lang="en-US"/>
+          </a:p>
+        </p:txBody>
+      </p:sp>
+    </p:spTree>
+    <p:extLst>
+      <p:ext uri="{BB962C8B-B14F-4D97-AF65-F5344CB8AC3E}">
+        <p14:creationId xmlns:p14="http://schemas.microsoft.com/office/powerpoint/2010/main" val="1222102959"/>
       </p:ext>
     </p:extLst>
   </p:cSld>
@@ -902,7 +1107,7 @@
           <a:p>
             <a:fld id="{6A6E4237-9E27-40CF-A4D8-1330F92F21DA}" type="datetimeFigureOut">
               <a:rPr lang="en-US" smtClean="0"/>
-              <a:t>12/1/2021</a:t>
+              <a:t>12/2/2021</a:t>
             </a:fld>
             <a:endParaRPr lang="en-US"/>
           </a:p>
@@ -1100,7 +1305,7 @@
           <a:p>
             <a:fld id="{6A6E4237-9E27-40CF-A4D8-1330F92F21DA}" type="datetimeFigureOut">
               <a:rPr lang="en-US" smtClean="0"/>
-              <a:t>12/1/2021</a:t>
+              <a:t>12/2/2021</a:t>
             </a:fld>
             <a:endParaRPr lang="en-US"/>
           </a:p>
@@ -1308,7 +1513,7 @@
           <a:p>
             <a:fld id="{6A6E4237-9E27-40CF-A4D8-1330F92F21DA}" type="datetimeFigureOut">
               <a:rPr lang="en-US" smtClean="0"/>
-              <a:t>12/1/2021</a:t>
+              <a:t>12/2/2021</a:t>
             </a:fld>
             <a:endParaRPr lang="en-US"/>
           </a:p>
@@ -1506,7 +1711,7 @@
           <a:p>
             <a:fld id="{6A6E4237-9E27-40CF-A4D8-1330F92F21DA}" type="datetimeFigureOut">
               <a:rPr lang="en-US" smtClean="0"/>
-              <a:t>12/1/2021</a:t>
+              <a:t>12/2/2021</a:t>
             </a:fld>
             <a:endParaRPr lang="en-US"/>
           </a:p>
@@ -1781,7 +1986,7 @@
           <a:p>
             <a:fld id="{6A6E4237-9E27-40CF-A4D8-1330F92F21DA}" type="datetimeFigureOut">
               <a:rPr lang="en-US" smtClean="0"/>
-              <a:t>12/1/2021</a:t>
+              <a:t>12/2/2021</a:t>
             </a:fld>
             <a:endParaRPr lang="en-US"/>
           </a:p>
@@ -2046,7 +2251,7 @@
           <a:p>
             <a:fld id="{6A6E4237-9E27-40CF-A4D8-1330F92F21DA}" type="datetimeFigureOut">
               <a:rPr lang="en-US" smtClean="0"/>
-              <a:t>12/1/2021</a:t>
+              <a:t>12/2/2021</a:t>
             </a:fld>
             <a:endParaRPr lang="en-US"/>
           </a:p>
@@ -2458,7 +2663,7 @@
           <a:p>
             <a:fld id="{6A6E4237-9E27-40CF-A4D8-1330F92F21DA}" type="datetimeFigureOut">
               <a:rPr lang="en-US" smtClean="0"/>
-              <a:t>12/1/2021</a:t>
+              <a:t>12/2/2021</a:t>
             </a:fld>
             <a:endParaRPr lang="en-US"/>
           </a:p>
@@ -2599,7 +2804,7 @@
           <a:p>
             <a:fld id="{6A6E4237-9E27-40CF-A4D8-1330F92F21DA}" type="datetimeFigureOut">
               <a:rPr lang="en-US" smtClean="0"/>
-              <a:t>12/1/2021</a:t>
+              <a:t>12/2/2021</a:t>
             </a:fld>
             <a:endParaRPr lang="en-US"/>
           </a:p>
@@ -2712,7 +2917,7 @@
           <a:p>
             <a:fld id="{6A6E4237-9E27-40CF-A4D8-1330F92F21DA}" type="datetimeFigureOut">
               <a:rPr lang="en-US" smtClean="0"/>
-              <a:t>12/1/2021</a:t>
+              <a:t>12/2/2021</a:t>
             </a:fld>
             <a:endParaRPr lang="en-US"/>
           </a:p>
@@ -3023,7 +3228,7 @@
           <a:p>
             <a:fld id="{6A6E4237-9E27-40CF-A4D8-1330F92F21DA}" type="datetimeFigureOut">
               <a:rPr lang="en-US" smtClean="0"/>
-              <a:t>12/1/2021</a:t>
+              <a:t>12/2/2021</a:t>
             </a:fld>
             <a:endParaRPr lang="en-US"/>
           </a:p>
@@ -3311,7 +3516,7 @@
           <a:p>
             <a:fld id="{6A6E4237-9E27-40CF-A4D8-1330F92F21DA}" type="datetimeFigureOut">
               <a:rPr lang="en-US" smtClean="0"/>
-              <a:t>12/1/2021</a:t>
+              <a:t>12/2/2021</a:t>
             </a:fld>
             <a:endParaRPr lang="en-US"/>
           </a:p>
@@ -3552,7 +3757,7 @@
           <a:p>
             <a:fld id="{6A6E4237-9E27-40CF-A4D8-1330F92F21DA}" type="datetimeFigureOut">
               <a:rPr lang="en-US" smtClean="0"/>
-              <a:t>12/1/2021</a:t>
+              <a:t>12/2/2021</a:t>
             </a:fld>
             <a:endParaRPr lang="en-US"/>
           </a:p>
@@ -4272,7 +4477,7 @@
           <p:nvPr/>
         </p:nvPicPr>
         <p:blipFill>
-          <a:blip r:embed="rId2">
+          <a:blip r:embed="rId3">
             <a:extLst>
               <a:ext uri="{28A0092B-C50C-407E-A947-70E740481C1C}">
                 <a14:useLocalDpi xmlns:a14="http://schemas.microsoft.com/office/drawing/2010/main" val="0"/>
@@ -4673,6 +4878,179 @@
     <p:extLst>
       <p:ext uri="{BB962C8B-B14F-4D97-AF65-F5344CB8AC3E}">
         <p14:creationId xmlns:p14="http://schemas.microsoft.com/office/powerpoint/2010/main" val="1230404432"/>
+      </p:ext>
+    </p:extLst>
+  </p:cSld>
+  <p:clrMapOvr>
+    <a:masterClrMapping/>
+  </p:clrMapOvr>
+</p:sld>
+</file>
+
+<file path=ppt/slides/slide6.xml><?xml version="1.0" encoding="utf-8"?>
+<p:sld xmlns:a="http://schemas.openxmlformats.org/drawingml/2006/main" xmlns:r="http://schemas.openxmlformats.org/officeDocument/2006/relationships" xmlns:p="http://schemas.openxmlformats.org/presentationml/2006/main">
+  <p:cSld>
+    <p:spTree>
+      <p:nvGrpSpPr>
+        <p:cNvPr id="1" name=""/>
+        <p:cNvGrpSpPr/>
+        <p:nvPr/>
+      </p:nvGrpSpPr>
+      <p:grpSpPr>
+        <a:xfrm>
+          <a:off x="0" y="0"/>
+          <a:ext cx="0" cy="0"/>
+          <a:chOff x="0" y="0"/>
+          <a:chExt cx="0" cy="0"/>
+        </a:xfrm>
+      </p:grpSpPr>
+      <p:sp>
+        <p:nvSpPr>
+          <p:cNvPr id="2" name="Title 1">
+            <a:extLst>
+              <a:ext uri="{FF2B5EF4-FFF2-40B4-BE49-F238E27FC236}">
+                <a16:creationId xmlns:a16="http://schemas.microsoft.com/office/drawing/2014/main" id="{1DA4FD9C-0575-4672-BDCF-805449EFAC7C}"/>
+              </a:ext>
+            </a:extLst>
+          </p:cNvPr>
+          <p:cNvSpPr>
+            <a:spLocks noGrp="1"/>
+          </p:cNvSpPr>
+          <p:nvPr>
+            <p:ph type="title"/>
+          </p:nvPr>
+        </p:nvSpPr>
+        <p:spPr/>
+        <p:txBody>
+          <a:bodyPr/>
+          <a:lstStyle/>
+          <a:p>
+            <a:r>
+              <a:rPr lang="en-US" dirty="0"/>
+              <a:t>//TODO</a:t>
+            </a:r>
+          </a:p>
+        </p:txBody>
+      </p:sp>
+      <p:sp>
+        <p:nvSpPr>
+          <p:cNvPr id="3" name="Content Placeholder 2">
+            <a:extLst>
+              <a:ext uri="{FF2B5EF4-FFF2-40B4-BE49-F238E27FC236}">
+                <a16:creationId xmlns:a16="http://schemas.microsoft.com/office/drawing/2014/main" id="{B7017510-3A51-4778-BB7F-0F91AE0D6F96}"/>
+              </a:ext>
+            </a:extLst>
+          </p:cNvPr>
+          <p:cNvSpPr>
+            <a:spLocks noGrp="1"/>
+          </p:cNvSpPr>
+          <p:nvPr>
+            <p:ph idx="1"/>
+          </p:nvPr>
+        </p:nvSpPr>
+        <p:spPr/>
+        <p:txBody>
+          <a:bodyPr>
+            <a:normAutofit/>
+          </a:bodyPr>
+          <a:lstStyle/>
+          <a:p>
+            <a:r>
+              <a:rPr lang="en-US" dirty="0">
+                <a:latin typeface="Yu Gothic" panose="020B0400000000000000" pitchFamily="34" charset="-128"/>
+                <a:ea typeface="Yu Gothic" panose="020B0400000000000000" pitchFamily="34" charset="-128"/>
+                <a:sym typeface="Wingdings" panose="05000000000000000000" pitchFamily="2" charset="2"/>
+              </a:rPr>
+              <a:t>Check literature for pi comparison figures – if someone else has done similar analysis, make sure to cite</a:t>
+            </a:r>
+          </a:p>
+          <a:p>
+            <a:pPr lvl="1"/>
+            <a:r>
+              <a:rPr lang="en-US" dirty="0">
+                <a:latin typeface="Yu Gothic" panose="020B0400000000000000" pitchFamily="34" charset="-128"/>
+                <a:ea typeface="Yu Gothic" panose="020B0400000000000000" pitchFamily="34" charset="-128"/>
+                <a:sym typeface="Wingdings" panose="05000000000000000000" pitchFamily="2" charset="2"/>
+              </a:rPr>
+              <a:t>(ok to recreate)</a:t>
+            </a:r>
+          </a:p>
+          <a:p>
+            <a:r>
+              <a:rPr lang="en-US" dirty="0">
+                <a:latin typeface="Yu Gothic" panose="020B0400000000000000" pitchFamily="34" charset="-128"/>
+                <a:ea typeface="Yu Gothic" panose="020B0400000000000000" pitchFamily="34" charset="-128"/>
+                <a:sym typeface="Wingdings" panose="05000000000000000000" pitchFamily="2" charset="2"/>
+              </a:rPr>
+              <a:t>Do literature search on pi comparison figure, add write-up describing results </a:t>
+            </a:r>
+            <a:r>
+              <a:rPr lang="en-US" i="1" dirty="0">
+                <a:latin typeface="Yu Gothic" panose="020B0400000000000000" pitchFamily="34" charset="-128"/>
+                <a:ea typeface="Yu Gothic" panose="020B0400000000000000" pitchFamily="34" charset="-128"/>
+                <a:sym typeface="Wingdings" panose="05000000000000000000" pitchFamily="2" charset="2"/>
+              </a:rPr>
+              <a:t>by next week</a:t>
+            </a:r>
+            <a:r>
+              <a:rPr lang="en-US" dirty="0">
+                <a:latin typeface="Yu Gothic" panose="020B0400000000000000" pitchFamily="34" charset="-128"/>
+                <a:ea typeface="Yu Gothic" panose="020B0400000000000000" pitchFamily="34" charset="-128"/>
+                <a:sym typeface="Wingdings" panose="05000000000000000000" pitchFamily="2" charset="2"/>
+              </a:rPr>
+              <a:t>.</a:t>
+            </a:r>
+          </a:p>
+          <a:p>
+            <a:pPr lvl="1"/>
+            <a:r>
+              <a:rPr lang="en-US" dirty="0">
+                <a:latin typeface="Yu Gothic" panose="020B0400000000000000" pitchFamily="34" charset="-128"/>
+                <a:ea typeface="Yu Gothic" panose="020B0400000000000000" pitchFamily="34" charset="-128"/>
+                <a:sym typeface="Wingdings" panose="05000000000000000000" pitchFamily="2" charset="2"/>
+              </a:rPr>
+              <a:t>Perform t-tests for significance.</a:t>
+            </a:r>
+          </a:p>
+          <a:p>
+            <a:r>
+              <a:rPr lang="en-US" dirty="0">
+                <a:latin typeface="Yu Gothic" panose="020B0400000000000000" pitchFamily="34" charset="-128"/>
+                <a:ea typeface="Yu Gothic" panose="020B0400000000000000" pitchFamily="34" charset="-128"/>
+                <a:sym typeface="Wingdings" panose="05000000000000000000" pitchFamily="2" charset="2"/>
+              </a:rPr>
+              <a:t>Fix across-pi computation, consider two methods (pairwise pi calculation for two samples, take average vs. consider all alleles at same time)</a:t>
+            </a:r>
+          </a:p>
+          <a:p>
+            <a:r>
+              <a:rPr lang="en-US" dirty="0">
+                <a:latin typeface="Yu Gothic" panose="020B0400000000000000" pitchFamily="34" charset="-128"/>
+                <a:ea typeface="Yu Gothic" panose="020B0400000000000000" pitchFamily="34" charset="-128"/>
+                <a:sym typeface="Wingdings" panose="05000000000000000000" pitchFamily="2" charset="2"/>
+              </a:rPr>
+              <a:t>Fix MIDAS species step, </a:t>
+            </a:r>
+            <a:r>
+              <a:rPr lang="en-US" b="1" dirty="0">
+                <a:latin typeface="Yu Gothic" panose="020B0400000000000000" pitchFamily="34" charset="-128"/>
+                <a:ea typeface="Yu Gothic" panose="020B0400000000000000" pitchFamily="34" charset="-128"/>
+                <a:sym typeface="Wingdings" panose="05000000000000000000" pitchFamily="2" charset="2"/>
+              </a:rPr>
+              <a:t>check in on Monday or before</a:t>
+            </a:r>
+            <a:endParaRPr lang="en-US" dirty="0">
+              <a:latin typeface="Yu Gothic" panose="020B0400000000000000" pitchFamily="34" charset="-128"/>
+              <a:ea typeface="Yu Gothic" panose="020B0400000000000000" pitchFamily="34" charset="-128"/>
+              <a:sym typeface="Wingdings" panose="05000000000000000000" pitchFamily="2" charset="2"/>
+            </a:endParaRPr>
+          </a:p>
+        </p:txBody>
+      </p:sp>
+    </p:spTree>
+    <p:extLst>
+      <p:ext uri="{BB962C8B-B14F-4D97-AF65-F5344CB8AC3E}">
+        <p14:creationId xmlns:p14="http://schemas.microsoft.com/office/powerpoint/2010/main" val="897933235"/>
       </p:ext>
     </p:extLst>
   </p:cSld>

</xml_diff>